<commit_message>
Added pdf gating scheme
</commit_message>
<xml_diff>
--- a/img/Gating_scheme.pptx
+++ b/img/Gating_scheme.pptx
@@ -266,7 +266,7 @@
           <a:p>
             <a:fld id="{75E09A0C-5BAE-B54D-B5A6-CAFBBC837915}" type="datetimeFigureOut">
               <a:rPr lang="en-GB" smtClean="0"/>
-              <a:t>06/05/2022</a:t>
+              <a:t>09/05/2022</a:t>
             </a:fld>
             <a:endParaRPr lang="en-GB"/>
           </a:p>
@@ -464,7 +464,7 @@
           <a:p>
             <a:fld id="{75E09A0C-5BAE-B54D-B5A6-CAFBBC837915}" type="datetimeFigureOut">
               <a:rPr lang="en-GB" smtClean="0"/>
-              <a:t>06/05/2022</a:t>
+              <a:t>09/05/2022</a:t>
             </a:fld>
             <a:endParaRPr lang="en-GB"/>
           </a:p>
@@ -672,7 +672,7 @@
           <a:p>
             <a:fld id="{75E09A0C-5BAE-B54D-B5A6-CAFBBC837915}" type="datetimeFigureOut">
               <a:rPr lang="en-GB" smtClean="0"/>
-              <a:t>06/05/2022</a:t>
+              <a:t>09/05/2022</a:t>
             </a:fld>
             <a:endParaRPr lang="en-GB"/>
           </a:p>
@@ -870,7 +870,7 @@
           <a:p>
             <a:fld id="{75E09A0C-5BAE-B54D-B5A6-CAFBBC837915}" type="datetimeFigureOut">
               <a:rPr lang="en-GB" smtClean="0"/>
-              <a:t>06/05/2022</a:t>
+              <a:t>09/05/2022</a:t>
             </a:fld>
             <a:endParaRPr lang="en-GB"/>
           </a:p>
@@ -1145,7 +1145,7 @@
           <a:p>
             <a:fld id="{75E09A0C-5BAE-B54D-B5A6-CAFBBC837915}" type="datetimeFigureOut">
               <a:rPr lang="en-GB" smtClean="0"/>
-              <a:t>06/05/2022</a:t>
+              <a:t>09/05/2022</a:t>
             </a:fld>
             <a:endParaRPr lang="en-GB"/>
           </a:p>
@@ -1410,7 +1410,7 @@
           <a:p>
             <a:fld id="{75E09A0C-5BAE-B54D-B5A6-CAFBBC837915}" type="datetimeFigureOut">
               <a:rPr lang="en-GB" smtClean="0"/>
-              <a:t>06/05/2022</a:t>
+              <a:t>09/05/2022</a:t>
             </a:fld>
             <a:endParaRPr lang="en-GB"/>
           </a:p>
@@ -1822,7 +1822,7 @@
           <a:p>
             <a:fld id="{75E09A0C-5BAE-B54D-B5A6-CAFBBC837915}" type="datetimeFigureOut">
               <a:rPr lang="en-GB" smtClean="0"/>
-              <a:t>06/05/2022</a:t>
+              <a:t>09/05/2022</a:t>
             </a:fld>
             <a:endParaRPr lang="en-GB"/>
           </a:p>
@@ -1963,7 +1963,7 @@
           <a:p>
             <a:fld id="{75E09A0C-5BAE-B54D-B5A6-CAFBBC837915}" type="datetimeFigureOut">
               <a:rPr lang="en-GB" smtClean="0"/>
-              <a:t>06/05/2022</a:t>
+              <a:t>09/05/2022</a:t>
             </a:fld>
             <a:endParaRPr lang="en-GB"/>
           </a:p>
@@ -2076,7 +2076,7 @@
           <a:p>
             <a:fld id="{75E09A0C-5BAE-B54D-B5A6-CAFBBC837915}" type="datetimeFigureOut">
               <a:rPr lang="en-GB" smtClean="0"/>
-              <a:t>06/05/2022</a:t>
+              <a:t>09/05/2022</a:t>
             </a:fld>
             <a:endParaRPr lang="en-GB"/>
           </a:p>
@@ -2387,7 +2387,7 @@
           <a:p>
             <a:fld id="{75E09A0C-5BAE-B54D-B5A6-CAFBBC837915}" type="datetimeFigureOut">
               <a:rPr lang="en-GB" smtClean="0"/>
-              <a:t>06/05/2022</a:t>
+              <a:t>09/05/2022</a:t>
             </a:fld>
             <a:endParaRPr lang="en-GB"/>
           </a:p>
@@ -2675,7 +2675,7 @@
           <a:p>
             <a:fld id="{75E09A0C-5BAE-B54D-B5A6-CAFBBC837915}" type="datetimeFigureOut">
               <a:rPr lang="en-GB" smtClean="0"/>
-              <a:t>06/05/2022</a:t>
+              <a:t>09/05/2022</a:t>
             </a:fld>
             <a:endParaRPr lang="en-GB"/>
           </a:p>
@@ -2916,7 +2916,7 @@
           <a:p>
             <a:fld id="{75E09A0C-5BAE-B54D-B5A6-CAFBBC837915}" type="datetimeFigureOut">
               <a:rPr lang="en-GB" smtClean="0"/>
-              <a:t>06/05/2022</a:t>
+              <a:t>09/05/2022</a:t>
             </a:fld>
             <a:endParaRPr lang="en-GB"/>
           </a:p>
@@ -4320,6 +4320,289 @@
           </a:p>
         </p:txBody>
       </p:sp>
+      <p:cxnSp>
+        <p:nvCxnSpPr>
+          <p:cNvPr id="17" name="Straight Connector 3">
+            <a:extLst>
+              <a:ext uri="{FF2B5EF4-FFF2-40B4-BE49-F238E27FC236}">
+                <a16:creationId xmlns:a16="http://schemas.microsoft.com/office/drawing/2014/main" id="{D30887F6-3850-AB31-D95B-03D74FFFF233}"/>
+              </a:ext>
+            </a:extLst>
+          </p:cNvPr>
+          <p:cNvCxnSpPr/>
+          <p:nvPr/>
+        </p:nvCxnSpPr>
+        <p:spPr>
+          <a:xfrm>
+            <a:off x="7026359" y="1918466"/>
+            <a:ext cx="0" cy="2160000"/>
+          </a:xfrm>
+          <a:prstGeom prst="line">
+            <a:avLst/>
+          </a:prstGeom>
+          <a:ln w="28575" cap="rnd">
+            <a:solidFill>
+              <a:schemeClr val="tx1"/>
+            </a:solidFill>
+          </a:ln>
+        </p:spPr>
+        <p:style>
+          <a:lnRef idx="1">
+            <a:schemeClr val="accent1"/>
+          </a:lnRef>
+          <a:fillRef idx="0">
+            <a:schemeClr val="accent1"/>
+          </a:fillRef>
+          <a:effectRef idx="0">
+            <a:schemeClr val="accent1"/>
+          </a:effectRef>
+          <a:fontRef idx="minor">
+            <a:schemeClr val="tx1"/>
+          </a:fontRef>
+        </p:style>
+      </p:cxnSp>
+      <p:cxnSp>
+        <p:nvCxnSpPr>
+          <p:cNvPr id="18" name="Straight Connector 4">
+            <a:extLst>
+              <a:ext uri="{FF2B5EF4-FFF2-40B4-BE49-F238E27FC236}">
+                <a16:creationId xmlns:a16="http://schemas.microsoft.com/office/drawing/2014/main" id="{B34EA1B9-0241-DAB9-7C99-58EF8C22BD97}"/>
+              </a:ext>
+            </a:extLst>
+          </p:cNvPr>
+          <p:cNvCxnSpPr>
+            <a:cxnSpLocks/>
+          </p:cNvCxnSpPr>
+          <p:nvPr/>
+        </p:nvCxnSpPr>
+        <p:spPr>
+          <a:xfrm flipH="1">
+            <a:off x="7026359" y="4078466"/>
+            <a:ext cx="2160000" cy="0"/>
+          </a:xfrm>
+          <a:prstGeom prst="line">
+            <a:avLst/>
+          </a:prstGeom>
+          <a:ln w="28575" cap="rnd">
+            <a:solidFill>
+              <a:schemeClr val="tx1"/>
+            </a:solidFill>
+          </a:ln>
+        </p:spPr>
+        <p:style>
+          <a:lnRef idx="1">
+            <a:schemeClr val="accent1"/>
+          </a:lnRef>
+          <a:fillRef idx="0">
+            <a:schemeClr val="accent1"/>
+          </a:fillRef>
+          <a:effectRef idx="0">
+            <a:schemeClr val="accent1"/>
+          </a:effectRef>
+          <a:fontRef idx="minor">
+            <a:schemeClr val="tx1"/>
+          </a:fontRef>
+        </p:style>
+      </p:cxnSp>
+      <p:sp>
+        <p:nvSpPr>
+          <p:cNvPr id="19" name="TextBox 5">
+            <a:extLst>
+              <a:ext uri="{FF2B5EF4-FFF2-40B4-BE49-F238E27FC236}">
+                <a16:creationId xmlns:a16="http://schemas.microsoft.com/office/drawing/2014/main" id="{1B4A362D-DB78-B532-28A3-40A7B3D5CBAB}"/>
+              </a:ext>
+            </a:extLst>
+          </p:cNvPr>
+          <p:cNvSpPr txBox="1"/>
+          <p:nvPr/>
+        </p:nvSpPr>
+        <p:spPr>
+          <a:xfrm rot="16200000">
+            <a:off x="6341914" y="2621389"/>
+            <a:ext cx="829246" cy="369332"/>
+          </a:xfrm>
+          <a:prstGeom prst="rect">
+            <a:avLst/>
+          </a:prstGeom>
+          <a:noFill/>
+        </p:spPr>
+        <p:txBody>
+          <a:bodyPr wrap="square" rtlCol="0">
+            <a:spAutoFit/>
+          </a:bodyPr>
+          <a:lstStyle/>
+          <a:p>
+            <a:r>
+              <a:rPr lang="en-GB" dirty="0"/>
+              <a:t>MPO</a:t>
+            </a:r>
+          </a:p>
+        </p:txBody>
+      </p:sp>
+      <p:sp>
+        <p:nvSpPr>
+          <p:cNvPr id="20" name="TextBox 6">
+            <a:extLst>
+              <a:ext uri="{FF2B5EF4-FFF2-40B4-BE49-F238E27FC236}">
+                <a16:creationId xmlns:a16="http://schemas.microsoft.com/office/drawing/2014/main" id="{2E7F48C5-4E37-13D1-F786-DB091B213535}"/>
+              </a:ext>
+            </a:extLst>
+          </p:cNvPr>
+          <p:cNvSpPr txBox="1"/>
+          <p:nvPr/>
+        </p:nvSpPr>
+        <p:spPr>
+          <a:xfrm>
+            <a:off x="7689713" y="4153959"/>
+            <a:ext cx="684803" cy="369332"/>
+          </a:xfrm>
+          <a:prstGeom prst="rect">
+            <a:avLst/>
+          </a:prstGeom>
+          <a:noFill/>
+        </p:spPr>
+        <p:txBody>
+          <a:bodyPr wrap="none" rtlCol="0">
+            <a:spAutoFit/>
+          </a:bodyPr>
+          <a:lstStyle/>
+          <a:p>
+            <a:r>
+              <a:rPr lang="en-GB" dirty="0"/>
+              <a:t>CD38</a:t>
+            </a:r>
+          </a:p>
+        </p:txBody>
+      </p:sp>
+      <p:sp>
+        <p:nvSpPr>
+          <p:cNvPr id="21" name="Rectangle 7">
+            <a:extLst>
+              <a:ext uri="{FF2B5EF4-FFF2-40B4-BE49-F238E27FC236}">
+                <a16:creationId xmlns:a16="http://schemas.microsoft.com/office/drawing/2014/main" id="{527424B2-200E-069F-414E-2EA97F7F1168}"/>
+              </a:ext>
+            </a:extLst>
+          </p:cNvPr>
+          <p:cNvSpPr/>
+          <p:nvPr/>
+        </p:nvSpPr>
+        <p:spPr>
+          <a:xfrm>
+            <a:off x="7097213" y="3059423"/>
+            <a:ext cx="1047222" cy="964788"/>
+          </a:xfrm>
+          <a:prstGeom prst="rect">
+            <a:avLst/>
+          </a:prstGeom>
+          <a:noFill/>
+          <a:ln w="19050">
+            <a:solidFill>
+              <a:schemeClr val="tx1"/>
+            </a:solidFill>
+          </a:ln>
+        </p:spPr>
+        <p:style>
+          <a:lnRef idx="2">
+            <a:schemeClr val="accent1">
+              <a:shade val="50000"/>
+            </a:schemeClr>
+          </a:lnRef>
+          <a:fillRef idx="1">
+            <a:schemeClr val="accent1"/>
+          </a:fillRef>
+          <a:effectRef idx="0">
+            <a:schemeClr val="accent1"/>
+          </a:effectRef>
+          <a:fontRef idx="minor">
+            <a:schemeClr val="lt1"/>
+          </a:fontRef>
+        </p:style>
+        <p:txBody>
+          <a:bodyPr rtlCol="0" anchor="ctr"/>
+          <a:lstStyle/>
+          <a:p>
+            <a:pPr algn="ctr"/>
+            <a:endParaRPr lang="en-GB"/>
+          </a:p>
+        </p:txBody>
+      </p:sp>
+      <p:sp>
+        <p:nvSpPr>
+          <p:cNvPr id="22" name="TextBox 8">
+            <a:extLst>
+              <a:ext uri="{FF2B5EF4-FFF2-40B4-BE49-F238E27FC236}">
+                <a16:creationId xmlns:a16="http://schemas.microsoft.com/office/drawing/2014/main" id="{AE7BD248-EDEB-CEFC-1D43-0A31359A1FE2}"/>
+              </a:ext>
+            </a:extLst>
+          </p:cNvPr>
+          <p:cNvSpPr txBox="1"/>
+          <p:nvPr/>
+        </p:nvSpPr>
+        <p:spPr>
+          <a:xfrm>
+            <a:off x="7002175" y="1414487"/>
+            <a:ext cx="724878" cy="369332"/>
+          </a:xfrm>
+          <a:prstGeom prst="rect">
+            <a:avLst/>
+          </a:prstGeom>
+          <a:noFill/>
+        </p:spPr>
+        <p:txBody>
+          <a:bodyPr wrap="none" rtlCol="0">
+            <a:spAutoFit/>
+          </a:bodyPr>
+          <a:lstStyle/>
+          <a:p>
+            <a:r>
+              <a:rPr lang="en-GB" dirty="0"/>
+              <a:t>Plot 2</a:t>
+            </a:r>
+          </a:p>
+        </p:txBody>
+      </p:sp>
+      <p:cxnSp>
+        <p:nvCxnSpPr>
+          <p:cNvPr id="23" name="Gerade Verbindung mit Pfeil 9">
+            <a:extLst>
+              <a:ext uri="{FF2B5EF4-FFF2-40B4-BE49-F238E27FC236}">
+                <a16:creationId xmlns:a16="http://schemas.microsoft.com/office/drawing/2014/main" id="{C8857B46-11E0-A0B3-0E37-C59778594B32}"/>
+              </a:ext>
+            </a:extLst>
+          </p:cNvPr>
+          <p:cNvCxnSpPr/>
+          <p:nvPr/>
+        </p:nvCxnSpPr>
+        <p:spPr>
+          <a:xfrm flipV="1">
+            <a:off x="4703863" y="3541817"/>
+            <a:ext cx="1681941" cy="15802"/>
+          </a:xfrm>
+          <a:prstGeom prst="straightConnector1">
+            <a:avLst/>
+          </a:prstGeom>
+          <a:ln w="25400">
+            <a:solidFill>
+              <a:schemeClr val="tx1"/>
+            </a:solidFill>
+            <a:tailEnd type="triangle"/>
+          </a:ln>
+        </p:spPr>
+        <p:style>
+          <a:lnRef idx="1">
+            <a:schemeClr val="accent1"/>
+          </a:lnRef>
+          <a:fillRef idx="0">
+            <a:schemeClr val="accent1"/>
+          </a:fillRef>
+          <a:effectRef idx="0">
+            <a:schemeClr val="accent1"/>
+          </a:effectRef>
+          <a:fontRef idx="minor">
+            <a:schemeClr val="tx1"/>
+          </a:fontRef>
+        </p:style>
+      </p:cxnSp>
     </p:spTree>
     <p:extLst>
       <p:ext uri="{BB962C8B-B14F-4D97-AF65-F5344CB8AC3E}">

</xml_diff>

<commit_message>
Corrected gating scheme based on what was labelled
</commit_message>
<xml_diff>
--- a/img/Gating_scheme.pptx
+++ b/img/Gating_scheme.pptx
@@ -266,7 +266,7 @@
           <a:p>
             <a:fld id="{75E09A0C-5BAE-B54D-B5A6-CAFBBC837915}" type="datetimeFigureOut">
               <a:rPr lang="en-GB" smtClean="0"/>
-              <a:t>09/05/2022</a:t>
+              <a:t>18/10/2023</a:t>
             </a:fld>
             <a:endParaRPr lang="en-GB"/>
           </a:p>
@@ -464,7 +464,7 @@
           <a:p>
             <a:fld id="{75E09A0C-5BAE-B54D-B5A6-CAFBBC837915}" type="datetimeFigureOut">
               <a:rPr lang="en-GB" smtClean="0"/>
-              <a:t>09/05/2022</a:t>
+              <a:t>18/10/2023</a:t>
             </a:fld>
             <a:endParaRPr lang="en-GB"/>
           </a:p>
@@ -672,7 +672,7 @@
           <a:p>
             <a:fld id="{75E09A0C-5BAE-B54D-B5A6-CAFBBC837915}" type="datetimeFigureOut">
               <a:rPr lang="en-GB" smtClean="0"/>
-              <a:t>09/05/2022</a:t>
+              <a:t>18/10/2023</a:t>
             </a:fld>
             <a:endParaRPr lang="en-GB"/>
           </a:p>
@@ -870,7 +870,7 @@
           <a:p>
             <a:fld id="{75E09A0C-5BAE-B54D-B5A6-CAFBBC837915}" type="datetimeFigureOut">
               <a:rPr lang="en-GB" smtClean="0"/>
-              <a:t>09/05/2022</a:t>
+              <a:t>18/10/2023</a:t>
             </a:fld>
             <a:endParaRPr lang="en-GB"/>
           </a:p>
@@ -1145,7 +1145,7 @@
           <a:p>
             <a:fld id="{75E09A0C-5BAE-B54D-B5A6-CAFBBC837915}" type="datetimeFigureOut">
               <a:rPr lang="en-GB" smtClean="0"/>
-              <a:t>09/05/2022</a:t>
+              <a:t>18/10/2023</a:t>
             </a:fld>
             <a:endParaRPr lang="en-GB"/>
           </a:p>
@@ -1410,7 +1410,7 @@
           <a:p>
             <a:fld id="{75E09A0C-5BAE-B54D-B5A6-CAFBBC837915}" type="datetimeFigureOut">
               <a:rPr lang="en-GB" smtClean="0"/>
-              <a:t>09/05/2022</a:t>
+              <a:t>18/10/2023</a:t>
             </a:fld>
             <a:endParaRPr lang="en-GB"/>
           </a:p>
@@ -1822,7 +1822,7 @@
           <a:p>
             <a:fld id="{75E09A0C-5BAE-B54D-B5A6-CAFBBC837915}" type="datetimeFigureOut">
               <a:rPr lang="en-GB" smtClean="0"/>
-              <a:t>09/05/2022</a:t>
+              <a:t>18/10/2023</a:t>
             </a:fld>
             <a:endParaRPr lang="en-GB"/>
           </a:p>
@@ -1963,7 +1963,7 @@
           <a:p>
             <a:fld id="{75E09A0C-5BAE-B54D-B5A6-CAFBBC837915}" type="datetimeFigureOut">
               <a:rPr lang="en-GB" smtClean="0"/>
-              <a:t>09/05/2022</a:t>
+              <a:t>18/10/2023</a:t>
             </a:fld>
             <a:endParaRPr lang="en-GB"/>
           </a:p>
@@ -2076,7 +2076,7 @@
           <a:p>
             <a:fld id="{75E09A0C-5BAE-B54D-B5A6-CAFBBC837915}" type="datetimeFigureOut">
               <a:rPr lang="en-GB" smtClean="0"/>
-              <a:t>09/05/2022</a:t>
+              <a:t>18/10/2023</a:t>
             </a:fld>
             <a:endParaRPr lang="en-GB"/>
           </a:p>
@@ -2387,7 +2387,7 @@
           <a:p>
             <a:fld id="{75E09A0C-5BAE-B54D-B5A6-CAFBBC837915}" type="datetimeFigureOut">
               <a:rPr lang="en-GB" smtClean="0"/>
-              <a:t>09/05/2022</a:t>
+              <a:t>18/10/2023</a:t>
             </a:fld>
             <a:endParaRPr lang="en-GB"/>
           </a:p>
@@ -2675,7 +2675,7 @@
           <a:p>
             <a:fld id="{75E09A0C-5BAE-B54D-B5A6-CAFBBC837915}" type="datetimeFigureOut">
               <a:rPr lang="en-GB" smtClean="0"/>
-              <a:t>09/05/2022</a:t>
+              <a:t>18/10/2023</a:t>
             </a:fld>
             <a:endParaRPr lang="en-GB"/>
           </a:p>
@@ -2916,7 +2916,7 @@
           <a:p>
             <a:fld id="{75E09A0C-5BAE-B54D-B5A6-CAFBBC837915}" type="datetimeFigureOut">
               <a:rPr lang="en-GB" smtClean="0"/>
-              <a:t>09/05/2022</a:t>
+              <a:t>18/10/2023</a:t>
             </a:fld>
             <a:endParaRPr lang="en-GB"/>
           </a:p>
@@ -3538,10 +3538,10 @@
       </p:sp>
       <p:sp>
         <p:nvSpPr>
-          <p:cNvPr id="12" name="TextBox 11">
-            <a:extLst>
-              <a:ext uri="{FF2B5EF4-FFF2-40B4-BE49-F238E27FC236}">
-                <a16:creationId xmlns:a16="http://schemas.microsoft.com/office/drawing/2014/main" id="{713DEF2E-5525-174E-8479-5B82D094952E}"/>
+          <p:cNvPr id="27" name="TextBox 26">
+            <a:extLst>
+              <a:ext uri="{FF2B5EF4-FFF2-40B4-BE49-F238E27FC236}">
+                <a16:creationId xmlns:a16="http://schemas.microsoft.com/office/drawing/2014/main" id="{CEE3547D-04DC-EA48-9255-C99588E64E0D}"/>
               </a:ext>
             </a:extLst>
           </p:cNvPr>
@@ -3550,8 +3550,8 @@
         </p:nvSpPr>
         <p:spPr>
           <a:xfrm>
-            <a:off x="3874237" y="3501283"/>
-            <a:ext cx="567784" cy="369332"/>
+            <a:off x="3188415" y="857175"/>
+            <a:ext cx="685822" cy="362219"/>
           </a:xfrm>
           <a:prstGeom prst="rect">
             <a:avLst/>
@@ -3566,41 +3566,6 @@
           <a:p>
             <a:r>
               <a:rPr lang="en-GB" dirty="0"/>
-              <a:t>CD3</a:t>
-            </a:r>
-          </a:p>
-        </p:txBody>
-      </p:sp>
-      <p:sp>
-        <p:nvSpPr>
-          <p:cNvPr id="27" name="TextBox 26">
-            <a:extLst>
-              <a:ext uri="{FF2B5EF4-FFF2-40B4-BE49-F238E27FC236}">
-                <a16:creationId xmlns:a16="http://schemas.microsoft.com/office/drawing/2014/main" id="{CEE3547D-04DC-EA48-9255-C99588E64E0D}"/>
-              </a:ext>
-            </a:extLst>
-          </p:cNvPr>
-          <p:cNvSpPr txBox="1"/>
-          <p:nvPr/>
-        </p:nvSpPr>
-        <p:spPr>
-          <a:xfrm>
-            <a:off x="3188415" y="857175"/>
-            <a:ext cx="685822" cy="362219"/>
-          </a:xfrm>
-          <a:prstGeom prst="rect">
-            <a:avLst/>
-          </a:prstGeom>
-          <a:noFill/>
-        </p:spPr>
-        <p:txBody>
-          <a:bodyPr wrap="none" rtlCol="0">
-            <a:spAutoFit/>
-          </a:bodyPr>
-          <a:lstStyle/>
-          <a:p>
-            <a:r>
-              <a:rPr lang="en-GB" dirty="0"/>
               <a:t>Plot 1</a:t>
             </a:r>
           </a:p>
@@ -3620,8 +3585,8 @@
         </p:nvSpPr>
         <p:spPr>
           <a:xfrm>
-            <a:off x="3373408" y="1360708"/>
-            <a:ext cx="1016780" cy="981702"/>
+            <a:off x="3373407" y="1360708"/>
+            <a:ext cx="1774321" cy="981702"/>
           </a:xfrm>
           <a:prstGeom prst="rect">
             <a:avLst/>

</xml_diff>